<commit_message>
Adding updated PPT file
</commit_message>
<xml_diff>
--- a/2018/Oct 2 - 2018 - Git Essentials/GitEssentials.pptx
+++ b/2018/Oct 2 - 2018 - Git Essentials/GitEssentials.pptx
@@ -7,6 +7,9 @@
   <p:sldIdLst>
     <p:sldId id="256" r:id="rId2"/>
     <p:sldId id="257" r:id="rId3"/>
+    <p:sldId id="259" r:id="rId4"/>
+    <p:sldId id="260" r:id="rId5"/>
+    <p:sldId id="258" r:id="rId6"/>
   </p:sldIdLst>
   <p:sldSz cx="12192000" cy="6858000"/>
   <p:notesSz cx="6858000" cy="9144000"/>
@@ -105,6 +108,11 @@
       </a:defRPr>
     </a:lvl9pPr>
   </p:defaultTextStyle>
+  <p:extLst>
+    <p:ext uri="{EFAFB233-063F-42B5-8137-9DF3F51BA10A}">
+      <p15:sldGuideLst xmlns:p15="http://schemas.microsoft.com/office/powerpoint/2012/main"/>
+    </p:ext>
+  </p:extLst>
 </p:presentation>
 </file>
 
@@ -165,7 +173,7 @@
           <a:noFill/>
           <a:extLst>
             <a:ext uri="{909E8E84-426E-40dd-AFC4-6F175D3DCCD1}">
-              <a14:hiddenFill xmlns:a14="http://schemas.microsoft.com/office/drawing/2010/main" xmlns="">
+              <a14:hiddenFill xmlns="" xmlns:a14="http://schemas.microsoft.com/office/drawing/2010/main">
                 <a:solidFill>
                   <a:srgbClr val="FFFFFF"/>
                 </a:solidFill>
@@ -224,7 +232,7 @@
             </a:ln>
             <a:extLst>
               <a:ext uri="{91240B29-F687-4f45-9708-019B960494DF}">
-                <a14:hiddenLine xmlns:a14="http://schemas.microsoft.com/office/drawing/2010/main" xmlns="" w="9525">
+                <a14:hiddenLine xmlns="" xmlns:a14="http://schemas.microsoft.com/office/drawing/2010/main" w="9525">
                   <a:solidFill>
                     <a:srgbClr val="000000"/>
                   </a:solidFill>
@@ -314,7 +322,7 @@
             </a:ln>
             <a:extLst>
               <a:ext uri="{91240B29-F687-4f45-9708-019B960494DF}">
-                <a14:hiddenLine xmlns:a14="http://schemas.microsoft.com/office/drawing/2010/main" xmlns="" w="9525">
+                <a14:hiddenLine xmlns="" xmlns:a14="http://schemas.microsoft.com/office/drawing/2010/main" w="9525">
                   <a:solidFill>
                     <a:srgbClr val="000000"/>
                   </a:solidFill>
@@ -404,7 +412,7 @@
             </a:ln>
             <a:extLst>
               <a:ext uri="{91240B29-F687-4f45-9708-019B960494DF}">
-                <a14:hiddenLine xmlns:a14="http://schemas.microsoft.com/office/drawing/2010/main" xmlns="" w="9525">
+                <a14:hiddenLine xmlns="" xmlns:a14="http://schemas.microsoft.com/office/drawing/2010/main" w="9525">
                   <a:solidFill>
                     <a:srgbClr val="000000"/>
                   </a:solidFill>
@@ -438,7 +446,7 @@
             </a:ln>
             <a:extLst>
               <a:ext uri="{91240B29-F687-4f45-9708-019B960494DF}">
-                <a14:hiddenLine xmlns:a14="http://schemas.microsoft.com/office/drawing/2010/main" xmlns="" w="9525">
+                <a14:hiddenLine xmlns="" xmlns:a14="http://schemas.microsoft.com/office/drawing/2010/main" w="9525">
                   <a:solidFill>
                     <a:srgbClr val="000000"/>
                   </a:solidFill>
@@ -528,7 +536,7 @@
             </a:ln>
             <a:extLst>
               <a:ext uri="{91240B29-F687-4f45-9708-019B960494DF}">
-                <a14:hiddenLine xmlns:a14="http://schemas.microsoft.com/office/drawing/2010/main" xmlns="" w="9525">
+                <a14:hiddenLine xmlns="" xmlns:a14="http://schemas.microsoft.com/office/drawing/2010/main" w="9525">
                   <a:solidFill>
                     <a:srgbClr val="000000"/>
                   </a:solidFill>
@@ -590,7 +598,7 @@
             </a:ln>
             <a:extLst>
               <a:ext uri="{91240B29-F687-4f45-9708-019B960494DF}">
-                <a14:hiddenLine xmlns:a14="http://schemas.microsoft.com/office/drawing/2010/main" xmlns="" w="9525">
+                <a14:hiddenLine xmlns="" xmlns:a14="http://schemas.microsoft.com/office/drawing/2010/main" w="9525">
                   <a:solidFill>
                     <a:srgbClr val="000000"/>
                   </a:solidFill>
@@ -652,7 +660,7 @@
             </a:ln>
             <a:extLst>
               <a:ext uri="{91240B29-F687-4f45-9708-019B960494DF}">
-                <a14:hiddenLine xmlns:a14="http://schemas.microsoft.com/office/drawing/2010/main" xmlns="" w="9525">
+                <a14:hiddenLine xmlns="" xmlns:a14="http://schemas.microsoft.com/office/drawing/2010/main" w="9525">
                   <a:solidFill>
                     <a:srgbClr val="000000"/>
                   </a:solidFill>
@@ -742,7 +750,7 @@
             </a:ln>
             <a:extLst>
               <a:ext uri="{91240B29-F687-4f45-9708-019B960494DF}">
-                <a14:hiddenLine xmlns:a14="http://schemas.microsoft.com/office/drawing/2010/main" xmlns="" w="9525">
+                <a14:hiddenLine xmlns="" xmlns:a14="http://schemas.microsoft.com/office/drawing/2010/main" w="9525">
                   <a:solidFill>
                     <a:srgbClr val="000000"/>
                   </a:solidFill>
@@ -804,7 +812,7 @@
             </a:ln>
             <a:extLst>
               <a:ext uri="{91240B29-F687-4f45-9708-019B960494DF}">
-                <a14:hiddenLine xmlns:a14="http://schemas.microsoft.com/office/drawing/2010/main" xmlns="" w="9525">
+                <a14:hiddenLine xmlns="" xmlns:a14="http://schemas.microsoft.com/office/drawing/2010/main" w="9525">
                   <a:solidFill>
                     <a:srgbClr val="000000"/>
                   </a:solidFill>
@@ -866,7 +874,7 @@
             </a:ln>
             <a:extLst>
               <a:ext uri="{91240B29-F687-4f45-9708-019B960494DF}">
-                <a14:hiddenLine xmlns:a14="http://schemas.microsoft.com/office/drawing/2010/main" xmlns="" w="9525">
+                <a14:hiddenLine xmlns="" xmlns:a14="http://schemas.microsoft.com/office/drawing/2010/main" w="9525">
                   <a:solidFill>
                     <a:srgbClr val="000000"/>
                   </a:solidFill>
@@ -956,7 +964,7 @@
             </a:ln>
             <a:extLst>
               <a:ext uri="{91240B29-F687-4f45-9708-019B960494DF}">
-                <a14:hiddenLine xmlns:a14="http://schemas.microsoft.com/office/drawing/2010/main" xmlns="" w="9525">
+                <a14:hiddenLine xmlns="" xmlns:a14="http://schemas.microsoft.com/office/drawing/2010/main" w="9525">
                   <a:solidFill>
                     <a:srgbClr val="000000"/>
                   </a:solidFill>
@@ -1046,7 +1054,7 @@
             </a:ln>
             <a:extLst>
               <a:ext uri="{91240B29-F687-4f45-9708-019B960494DF}">
-                <a14:hiddenLine xmlns:a14="http://schemas.microsoft.com/office/drawing/2010/main" xmlns="" w="9525">
+                <a14:hiddenLine xmlns="" xmlns:a14="http://schemas.microsoft.com/office/drawing/2010/main" w="9525">
                   <a:solidFill>
                     <a:srgbClr val="000000"/>
                   </a:solidFill>
@@ -1108,7 +1116,7 @@
             </a:ln>
             <a:extLst>
               <a:ext uri="{91240B29-F687-4f45-9708-019B960494DF}">
-                <a14:hiddenLine xmlns:a14="http://schemas.microsoft.com/office/drawing/2010/main" xmlns="" w="9525">
+                <a14:hiddenLine xmlns="" xmlns:a14="http://schemas.microsoft.com/office/drawing/2010/main" w="9525">
                   <a:solidFill>
                     <a:srgbClr val="000000"/>
                   </a:solidFill>
@@ -1218,7 +1226,7 @@
             </a:ln>
             <a:extLst>
               <a:ext uri="{91240B29-F687-4f45-9708-019B960494DF}">
-                <a14:hiddenLine xmlns:a14="http://schemas.microsoft.com/office/drawing/2010/main" xmlns="" w="9525">
+                <a14:hiddenLine xmlns="" xmlns:a14="http://schemas.microsoft.com/office/drawing/2010/main" w="9525">
                   <a:solidFill>
                     <a:srgbClr val="000000"/>
                   </a:solidFill>
@@ -1280,7 +1288,7 @@
             </a:ln>
             <a:extLst>
               <a:ext uri="{91240B29-F687-4f45-9708-019B960494DF}">
-                <a14:hiddenLine xmlns:a14="http://schemas.microsoft.com/office/drawing/2010/main" xmlns="" w="9525">
+                <a14:hiddenLine xmlns="" xmlns:a14="http://schemas.microsoft.com/office/drawing/2010/main" w="9525">
                   <a:solidFill>
                     <a:srgbClr val="000000"/>
                   </a:solidFill>
@@ -1370,7 +1378,7 @@
             </a:ln>
             <a:extLst>
               <a:ext uri="{91240B29-F687-4f45-9708-019B960494DF}">
-                <a14:hiddenLine xmlns:a14="http://schemas.microsoft.com/office/drawing/2010/main" xmlns="" w="9525">
+                <a14:hiddenLine xmlns="" xmlns:a14="http://schemas.microsoft.com/office/drawing/2010/main" w="9525">
                   <a:solidFill>
                     <a:srgbClr val="000000"/>
                   </a:solidFill>
@@ -1460,7 +1468,7 @@
             </a:ln>
             <a:extLst>
               <a:ext uri="{91240B29-F687-4f45-9708-019B960494DF}">
-                <a14:hiddenLine xmlns:a14="http://schemas.microsoft.com/office/drawing/2010/main" xmlns="" w="9525">
+                <a14:hiddenLine xmlns="" xmlns:a14="http://schemas.microsoft.com/office/drawing/2010/main" w="9525">
                   <a:solidFill>
                     <a:srgbClr val="000000"/>
                   </a:solidFill>
@@ -1522,7 +1530,7 @@
             </a:ln>
             <a:extLst>
               <a:ext uri="{91240B29-F687-4f45-9708-019B960494DF}">
-                <a14:hiddenLine xmlns:a14="http://schemas.microsoft.com/office/drawing/2010/main" xmlns="" w="9525">
+                <a14:hiddenLine xmlns="" xmlns:a14="http://schemas.microsoft.com/office/drawing/2010/main" w="9525">
                   <a:solidFill>
                     <a:srgbClr val="000000"/>
                   </a:solidFill>
@@ -1612,7 +1620,7 @@
             </a:ln>
             <a:extLst>
               <a:ext uri="{91240B29-F687-4f45-9708-019B960494DF}">
-                <a14:hiddenLine xmlns:a14="http://schemas.microsoft.com/office/drawing/2010/main" xmlns="" w="9525">
+                <a14:hiddenLine xmlns="" xmlns:a14="http://schemas.microsoft.com/office/drawing/2010/main" w="9525">
                   <a:solidFill>
                     <a:srgbClr val="000000"/>
                   </a:solidFill>
@@ -1702,7 +1710,7 @@
             </a:ln>
             <a:extLst>
               <a:ext uri="{91240B29-F687-4f45-9708-019B960494DF}">
-                <a14:hiddenLine xmlns:a14="http://schemas.microsoft.com/office/drawing/2010/main" xmlns="" w="9525">
+                <a14:hiddenLine xmlns="" xmlns:a14="http://schemas.microsoft.com/office/drawing/2010/main" w="9525">
                   <a:solidFill>
                     <a:srgbClr val="000000"/>
                   </a:solidFill>
@@ -1758,7 +1766,7 @@
             </a:ln>
             <a:extLst>
               <a:ext uri="{91240B29-F687-4f45-9708-019B960494DF}">
-                <a14:hiddenLine xmlns:a14="http://schemas.microsoft.com/office/drawing/2010/main" xmlns="" w="9525">
+                <a14:hiddenLine xmlns="" xmlns:a14="http://schemas.microsoft.com/office/drawing/2010/main" w="9525">
                   <a:solidFill>
                     <a:srgbClr val="000000"/>
                   </a:solidFill>
@@ -1848,7 +1856,7 @@
             </a:ln>
             <a:extLst>
               <a:ext uri="{91240B29-F687-4f45-9708-019B960494DF}">
-                <a14:hiddenLine xmlns:a14="http://schemas.microsoft.com/office/drawing/2010/main" xmlns="" w="9525">
+                <a14:hiddenLine xmlns="" xmlns:a14="http://schemas.microsoft.com/office/drawing/2010/main" w="9525">
                   <a:solidFill>
                     <a:srgbClr val="000000"/>
                   </a:solidFill>
@@ -1904,7 +1912,7 @@
             </a:ln>
             <a:extLst>
               <a:ext uri="{91240B29-F687-4f45-9708-019B960494DF}">
-                <a14:hiddenLine xmlns:a14="http://schemas.microsoft.com/office/drawing/2010/main" xmlns="" w="9525">
+                <a14:hiddenLine xmlns="" xmlns:a14="http://schemas.microsoft.com/office/drawing/2010/main" w="9525">
                   <a:solidFill>
                     <a:srgbClr val="000000"/>
                   </a:solidFill>
@@ -1994,7 +2002,7 @@
             </a:ln>
             <a:extLst>
               <a:ext uri="{91240B29-F687-4f45-9708-019B960494DF}">
-                <a14:hiddenLine xmlns:a14="http://schemas.microsoft.com/office/drawing/2010/main" xmlns="" w="9525">
+                <a14:hiddenLine xmlns="" xmlns:a14="http://schemas.microsoft.com/office/drawing/2010/main" w="9525">
                   <a:solidFill>
                     <a:srgbClr val="000000"/>
                   </a:solidFill>
@@ -2062,7 +2070,7 @@
             </a:ln>
             <a:extLst>
               <a:ext uri="{91240B29-F687-4f45-9708-019B960494DF}">
-                <a14:hiddenLine xmlns:a14="http://schemas.microsoft.com/office/drawing/2010/main" xmlns="" w="9525">
+                <a14:hiddenLine xmlns="" xmlns:a14="http://schemas.microsoft.com/office/drawing/2010/main" w="9525">
                   <a:solidFill>
                     <a:srgbClr val="000000"/>
                   </a:solidFill>
@@ -2152,7 +2160,7 @@
             </a:ln>
             <a:extLst>
               <a:ext uri="{91240B29-F687-4f45-9708-019B960494DF}">
-                <a14:hiddenLine xmlns:a14="http://schemas.microsoft.com/office/drawing/2010/main" xmlns="" w="9525">
+                <a14:hiddenLine xmlns="" xmlns:a14="http://schemas.microsoft.com/office/drawing/2010/main" w="9525">
                   <a:solidFill>
                     <a:srgbClr val="000000"/>
                   </a:solidFill>
@@ -2220,7 +2228,7 @@
             </a:ln>
             <a:extLst>
               <a:ext uri="{91240B29-F687-4f45-9708-019B960494DF}">
-                <a14:hiddenLine xmlns:a14="http://schemas.microsoft.com/office/drawing/2010/main" xmlns="" w="9525">
+                <a14:hiddenLine xmlns="" xmlns:a14="http://schemas.microsoft.com/office/drawing/2010/main" w="9525">
                   <a:solidFill>
                     <a:srgbClr val="000000"/>
                   </a:solidFill>
@@ -2310,7 +2318,7 @@
             </a:ln>
             <a:extLst>
               <a:ext uri="{91240B29-F687-4f45-9708-019B960494DF}">
-                <a14:hiddenLine xmlns:a14="http://schemas.microsoft.com/office/drawing/2010/main" xmlns="" w="9525">
+                <a14:hiddenLine xmlns="" xmlns:a14="http://schemas.microsoft.com/office/drawing/2010/main" w="9525">
                   <a:solidFill>
                     <a:srgbClr val="000000"/>
                   </a:solidFill>
@@ -2344,7 +2352,7 @@
             </a:ln>
             <a:extLst>
               <a:ext uri="{91240B29-F687-4f45-9708-019B960494DF}">
-                <a14:hiddenLine xmlns:a14="http://schemas.microsoft.com/office/drawing/2010/main" xmlns="" w="9525">
+                <a14:hiddenLine xmlns="" xmlns:a14="http://schemas.microsoft.com/office/drawing/2010/main" w="9525">
                   <a:solidFill>
                     <a:srgbClr val="000000"/>
                   </a:solidFill>
@@ -2434,7 +2442,7 @@
             </a:ln>
             <a:extLst>
               <a:ext uri="{91240B29-F687-4f45-9708-019B960494DF}">
-                <a14:hiddenLine xmlns:a14="http://schemas.microsoft.com/office/drawing/2010/main" xmlns="" w="9525">
+                <a14:hiddenLine xmlns="" xmlns:a14="http://schemas.microsoft.com/office/drawing/2010/main" w="9525">
                   <a:solidFill>
                     <a:srgbClr val="000000"/>
                   </a:solidFill>
@@ -2496,7 +2504,7 @@
             </a:ln>
             <a:extLst>
               <a:ext uri="{91240B29-F687-4f45-9708-019B960494DF}">
-                <a14:hiddenLine xmlns:a14="http://schemas.microsoft.com/office/drawing/2010/main" xmlns="" w="9525">
+                <a14:hiddenLine xmlns="" xmlns:a14="http://schemas.microsoft.com/office/drawing/2010/main" w="9525">
                   <a:solidFill>
                     <a:srgbClr val="000000"/>
                   </a:solidFill>
@@ -2558,7 +2566,7 @@
             </a:ln>
             <a:extLst>
               <a:ext uri="{91240B29-F687-4f45-9708-019B960494DF}">
-                <a14:hiddenLine xmlns:a14="http://schemas.microsoft.com/office/drawing/2010/main" xmlns="" w="9525">
+                <a14:hiddenLine xmlns="" xmlns:a14="http://schemas.microsoft.com/office/drawing/2010/main" w="9525">
                   <a:solidFill>
                     <a:srgbClr val="000000"/>
                   </a:solidFill>
@@ -2648,7 +2656,7 @@
             </a:ln>
             <a:extLst>
               <a:ext uri="{91240B29-F687-4f45-9708-019B960494DF}">
-                <a14:hiddenLine xmlns:a14="http://schemas.microsoft.com/office/drawing/2010/main" xmlns="" w="9525">
+                <a14:hiddenLine xmlns="" xmlns:a14="http://schemas.microsoft.com/office/drawing/2010/main" w="9525">
                   <a:solidFill>
                     <a:srgbClr val="000000"/>
                   </a:solidFill>
@@ -2716,7 +2724,7 @@
             </a:ln>
             <a:extLst>
               <a:ext uri="{91240B29-F687-4f45-9708-019B960494DF}">
-                <a14:hiddenLine xmlns:a14="http://schemas.microsoft.com/office/drawing/2010/main" xmlns="" w="9525">
+                <a14:hiddenLine xmlns="" xmlns:a14="http://schemas.microsoft.com/office/drawing/2010/main" w="9525">
                   <a:solidFill>
                     <a:srgbClr val="000000"/>
                   </a:solidFill>
@@ -2778,7 +2786,7 @@
             </a:ln>
             <a:extLst>
               <a:ext uri="{91240B29-F687-4f45-9708-019B960494DF}">
-                <a14:hiddenLine xmlns:a14="http://schemas.microsoft.com/office/drawing/2010/main" xmlns="" w="9525">
+                <a14:hiddenLine xmlns="" xmlns:a14="http://schemas.microsoft.com/office/drawing/2010/main" w="9525">
                   <a:solidFill>
                     <a:srgbClr val="000000"/>
                   </a:solidFill>
@@ -2868,7 +2876,7 @@
             </a:ln>
             <a:extLst>
               <a:ext uri="{91240B29-F687-4f45-9708-019B960494DF}">
-                <a14:hiddenLine xmlns:a14="http://schemas.microsoft.com/office/drawing/2010/main" xmlns="" w="9525">
+                <a14:hiddenLine xmlns="" xmlns:a14="http://schemas.microsoft.com/office/drawing/2010/main" w="9525">
                   <a:solidFill>
                     <a:srgbClr val="000000"/>
                   </a:solidFill>
@@ -2930,7 +2938,7 @@
             </a:ln>
             <a:extLst>
               <a:ext uri="{91240B29-F687-4f45-9708-019B960494DF}">
-                <a14:hiddenLine xmlns:a14="http://schemas.microsoft.com/office/drawing/2010/main" xmlns="" w="9525">
+                <a14:hiddenLine xmlns="" xmlns:a14="http://schemas.microsoft.com/office/drawing/2010/main" w="9525">
                   <a:solidFill>
                     <a:srgbClr val="000000"/>
                   </a:solidFill>
@@ -3020,7 +3028,7 @@
             </a:ln>
             <a:extLst>
               <a:ext uri="{91240B29-F687-4f45-9708-019B960494DF}">
-                <a14:hiddenLine xmlns:a14="http://schemas.microsoft.com/office/drawing/2010/main" xmlns="" w="9525">
+                <a14:hiddenLine xmlns="" xmlns:a14="http://schemas.microsoft.com/office/drawing/2010/main" w="9525">
                   <a:solidFill>
                     <a:srgbClr val="000000"/>
                   </a:solidFill>
@@ -3082,7 +3090,7 @@
             </a:ln>
             <a:extLst>
               <a:ext uri="{91240B29-F687-4f45-9708-019B960494DF}">
-                <a14:hiddenLine xmlns:a14="http://schemas.microsoft.com/office/drawing/2010/main" xmlns="" w="9525">
+                <a14:hiddenLine xmlns="" xmlns:a14="http://schemas.microsoft.com/office/drawing/2010/main" w="9525">
                   <a:solidFill>
                     <a:srgbClr val="000000"/>
                   </a:solidFill>
@@ -3172,7 +3180,7 @@
             </a:ln>
             <a:extLst>
               <a:ext uri="{91240B29-F687-4f45-9708-019B960494DF}">
-                <a14:hiddenLine xmlns:a14="http://schemas.microsoft.com/office/drawing/2010/main" xmlns="" w="9525">
+                <a14:hiddenLine xmlns="" xmlns:a14="http://schemas.microsoft.com/office/drawing/2010/main" w="9525">
                   <a:solidFill>
                     <a:srgbClr val="000000"/>
                   </a:solidFill>
@@ -3206,7 +3214,7 @@
             </a:ln>
             <a:extLst>
               <a:ext uri="{91240B29-F687-4f45-9708-019B960494DF}">
-                <a14:hiddenLine xmlns:a14="http://schemas.microsoft.com/office/drawing/2010/main" xmlns="" w="9525">
+                <a14:hiddenLine xmlns="" xmlns:a14="http://schemas.microsoft.com/office/drawing/2010/main" w="9525">
                   <a:solidFill>
                     <a:srgbClr val="000000"/>
                   </a:solidFill>
@@ -3271,7 +3279,7 @@
             </a:ln>
             <a:extLst>
               <a:ext uri="{91240B29-F687-4f45-9708-019B960494DF}">
-                <a14:hiddenLine xmlns:a14="http://schemas.microsoft.com/office/drawing/2010/main" xmlns="" w="9525">
+                <a14:hiddenLine xmlns="" xmlns:a14="http://schemas.microsoft.com/office/drawing/2010/main" w="9525">
                   <a:solidFill>
                     <a:srgbClr val="000000"/>
                   </a:solidFill>
@@ -3361,7 +3369,7 @@
             </a:ln>
             <a:extLst>
               <a:ext uri="{91240B29-F687-4f45-9708-019B960494DF}">
-                <a14:hiddenLine xmlns:a14="http://schemas.microsoft.com/office/drawing/2010/main" xmlns="" w="9525">
+                <a14:hiddenLine xmlns="" xmlns:a14="http://schemas.microsoft.com/office/drawing/2010/main" w="9525">
                   <a:solidFill>
                     <a:srgbClr val="000000"/>
                   </a:solidFill>
@@ -3423,7 +3431,7 @@
             </a:ln>
             <a:extLst>
               <a:ext uri="{91240B29-F687-4f45-9708-019B960494DF}">
-                <a14:hiddenLine xmlns:a14="http://schemas.microsoft.com/office/drawing/2010/main" xmlns="" w="9525">
+                <a14:hiddenLine xmlns="" xmlns:a14="http://schemas.microsoft.com/office/drawing/2010/main" w="9525">
                   <a:solidFill>
                     <a:srgbClr val="000000"/>
                   </a:solidFill>
@@ -3513,7 +3521,7 @@
             </a:ln>
             <a:extLst>
               <a:ext uri="{91240B29-F687-4f45-9708-019B960494DF}">
-                <a14:hiddenLine xmlns:a14="http://schemas.microsoft.com/office/drawing/2010/main" xmlns="" w="9525">
+                <a14:hiddenLine xmlns="" xmlns:a14="http://schemas.microsoft.com/office/drawing/2010/main" w="9525">
                   <a:solidFill>
                     <a:srgbClr val="000000"/>
                   </a:solidFill>
@@ -3603,7 +3611,7 @@
             </a:ln>
             <a:extLst>
               <a:ext uri="{91240B29-F687-4f45-9708-019B960494DF}">
-                <a14:hiddenLine xmlns:a14="http://schemas.microsoft.com/office/drawing/2010/main" xmlns="" w="9525">
+                <a14:hiddenLine xmlns="" xmlns:a14="http://schemas.microsoft.com/office/drawing/2010/main" w="9525">
                   <a:solidFill>
                     <a:srgbClr val="000000"/>
                   </a:solidFill>
@@ -3668,7 +3676,7 @@
             </a:ln>
             <a:extLst>
               <a:ext uri="{91240B29-F687-4f45-9708-019B960494DF}">
-                <a14:hiddenLine xmlns:a14="http://schemas.microsoft.com/office/drawing/2010/main" xmlns="" w="9525">
+                <a14:hiddenLine xmlns="" xmlns:a14="http://schemas.microsoft.com/office/drawing/2010/main" w="9525">
                   <a:solidFill>
                     <a:srgbClr val="000000"/>
                   </a:solidFill>
@@ -3730,7 +3738,7 @@
             </a:ln>
             <a:extLst>
               <a:ext uri="{91240B29-F687-4f45-9708-019B960494DF}">
-                <a14:hiddenLine xmlns:a14="http://schemas.microsoft.com/office/drawing/2010/main" xmlns="" w="9525">
+                <a14:hiddenLine xmlns="" xmlns:a14="http://schemas.microsoft.com/office/drawing/2010/main" w="9525">
                   <a:solidFill>
                     <a:srgbClr val="000000"/>
                   </a:solidFill>
@@ -3820,7 +3828,7 @@
             </a:ln>
             <a:extLst>
               <a:ext uri="{91240B29-F687-4f45-9708-019B960494DF}">
-                <a14:hiddenLine xmlns:a14="http://schemas.microsoft.com/office/drawing/2010/main" xmlns="" w="9525">
+                <a14:hiddenLine xmlns="" xmlns:a14="http://schemas.microsoft.com/office/drawing/2010/main" w="9525">
                   <a:solidFill>
                     <a:srgbClr val="000000"/>
                   </a:solidFill>
@@ -3910,7 +3918,7 @@
             </a:ln>
             <a:extLst>
               <a:ext uri="{91240B29-F687-4f45-9708-019B960494DF}">
-                <a14:hiddenLine xmlns:a14="http://schemas.microsoft.com/office/drawing/2010/main" xmlns="" w="9525">
+                <a14:hiddenLine xmlns="" xmlns:a14="http://schemas.microsoft.com/office/drawing/2010/main" w="9525">
                   <a:solidFill>
                     <a:srgbClr val="000000"/>
                   </a:solidFill>
@@ -3972,7 +3980,7 @@
             </a:ln>
             <a:extLst>
               <a:ext uri="{91240B29-F687-4f45-9708-019B960494DF}">
-                <a14:hiddenLine xmlns:a14="http://schemas.microsoft.com/office/drawing/2010/main" xmlns="" w="9525">
+                <a14:hiddenLine xmlns="" xmlns:a14="http://schemas.microsoft.com/office/drawing/2010/main" w="9525">
                   <a:solidFill>
                     <a:srgbClr val="000000"/>
                   </a:solidFill>
@@ -4092,7 +4100,7 @@
             </a:ln>
             <a:extLst>
               <a:ext uri="{91240B29-F687-4f45-9708-019B960494DF}">
-                <a14:hiddenLine xmlns:a14="http://schemas.microsoft.com/office/drawing/2010/main" xmlns="" w="9525">
+                <a14:hiddenLine xmlns="" xmlns:a14="http://schemas.microsoft.com/office/drawing/2010/main" w="9525">
                   <a:solidFill>
                     <a:srgbClr val="000000"/>
                   </a:solidFill>
@@ -4160,7 +4168,7 @@
             </a:ln>
             <a:extLst>
               <a:ext uri="{91240B29-F687-4f45-9708-019B960494DF}">
-                <a14:hiddenLine xmlns:a14="http://schemas.microsoft.com/office/drawing/2010/main" xmlns="" w="9525">
+                <a14:hiddenLine xmlns="" xmlns:a14="http://schemas.microsoft.com/office/drawing/2010/main" w="9525">
                   <a:solidFill>
                     <a:srgbClr val="000000"/>
                   </a:solidFill>
@@ -4250,7 +4258,7 @@
             </a:ln>
             <a:extLst>
               <a:ext uri="{91240B29-F687-4f45-9708-019B960494DF}">
-                <a14:hiddenLine xmlns:a14="http://schemas.microsoft.com/office/drawing/2010/main" xmlns="" w="9525">
+                <a14:hiddenLine xmlns="" xmlns:a14="http://schemas.microsoft.com/office/drawing/2010/main" w="9525">
                   <a:solidFill>
                     <a:srgbClr val="000000"/>
                   </a:solidFill>
@@ -8979,7 +8987,7 @@
           <a:noFill/>
           <a:extLst>
             <a:ext uri="{909E8E84-426E-40dd-AFC4-6F175D3DCCD1}">
-              <a14:hiddenFill xmlns:a14="http://schemas.microsoft.com/office/drawing/2010/main" xmlns="">
+              <a14:hiddenFill xmlns="" xmlns:a14="http://schemas.microsoft.com/office/drawing/2010/main">
                 <a:solidFill>
                   <a:srgbClr val="FFFFFF"/>
                 </a:solidFill>
@@ -9053,7 +9061,7 @@
               </a:ln>
               <a:extLst>
                 <a:ext uri="{91240B29-F687-4f45-9708-019B960494DF}">
-                  <a14:hiddenLine xmlns:a14="http://schemas.microsoft.com/office/drawing/2010/main" xmlns="" w="9525">
+                  <a14:hiddenLine xmlns="" xmlns:a14="http://schemas.microsoft.com/office/drawing/2010/main" w="9525">
                     <a:solidFill>
                       <a:srgbClr val="000000"/>
                     </a:solidFill>
@@ -9143,7 +9151,7 @@
               </a:ln>
               <a:extLst>
                 <a:ext uri="{91240B29-F687-4f45-9708-019B960494DF}">
-                  <a14:hiddenLine xmlns:a14="http://schemas.microsoft.com/office/drawing/2010/main" xmlns="" w="9525">
+                  <a14:hiddenLine xmlns="" xmlns:a14="http://schemas.microsoft.com/office/drawing/2010/main" w="9525">
                     <a:solidFill>
                       <a:srgbClr val="000000"/>
                     </a:solidFill>
@@ -9233,7 +9241,7 @@
               </a:ln>
               <a:extLst>
                 <a:ext uri="{91240B29-F687-4f45-9708-019B960494DF}">
-                  <a14:hiddenLine xmlns:a14="http://schemas.microsoft.com/office/drawing/2010/main" xmlns="" w="9525">
+                  <a14:hiddenLine xmlns="" xmlns:a14="http://schemas.microsoft.com/office/drawing/2010/main" w="9525">
                     <a:solidFill>
                       <a:srgbClr val="000000"/>
                     </a:solidFill>
@@ -9295,7 +9303,7 @@
               </a:ln>
               <a:extLst>
                 <a:ext uri="{91240B29-F687-4f45-9708-019B960494DF}">
-                  <a14:hiddenLine xmlns:a14="http://schemas.microsoft.com/office/drawing/2010/main" xmlns="" w="9525">
+                  <a14:hiddenLine xmlns="" xmlns:a14="http://schemas.microsoft.com/office/drawing/2010/main" w="9525">
                     <a:solidFill>
                       <a:srgbClr val="000000"/>
                     </a:solidFill>
@@ -9385,7 +9393,7 @@
               </a:ln>
               <a:extLst>
                 <a:ext uri="{91240B29-F687-4f45-9708-019B960494DF}">
-                  <a14:hiddenLine xmlns:a14="http://schemas.microsoft.com/office/drawing/2010/main" xmlns="" w="9525">
+                  <a14:hiddenLine xmlns="" xmlns:a14="http://schemas.microsoft.com/office/drawing/2010/main" w="9525">
                     <a:solidFill>
                       <a:srgbClr val="000000"/>
                     </a:solidFill>
@@ -9447,7 +9455,7 @@
               </a:ln>
               <a:extLst>
                 <a:ext uri="{91240B29-F687-4f45-9708-019B960494DF}">
-                  <a14:hiddenLine xmlns:a14="http://schemas.microsoft.com/office/drawing/2010/main" xmlns="" w="9525">
+                  <a14:hiddenLine xmlns="" xmlns:a14="http://schemas.microsoft.com/office/drawing/2010/main" w="9525">
                     <a:solidFill>
                       <a:srgbClr val="000000"/>
                     </a:solidFill>
@@ -9509,7 +9517,7 @@
               </a:ln>
               <a:extLst>
                 <a:ext uri="{91240B29-F687-4f45-9708-019B960494DF}">
-                  <a14:hiddenLine xmlns:a14="http://schemas.microsoft.com/office/drawing/2010/main" xmlns="" w="9525">
+                  <a14:hiddenLine xmlns="" xmlns:a14="http://schemas.microsoft.com/office/drawing/2010/main" w="9525">
                     <a:solidFill>
                       <a:srgbClr val="000000"/>
                     </a:solidFill>
@@ -9599,7 +9607,7 @@
               </a:ln>
               <a:extLst>
                 <a:ext uri="{91240B29-F687-4f45-9708-019B960494DF}">
-                  <a14:hiddenLine xmlns:a14="http://schemas.microsoft.com/office/drawing/2010/main" xmlns="" w="9525">
+                  <a14:hiddenLine xmlns="" xmlns:a14="http://schemas.microsoft.com/office/drawing/2010/main" w="9525">
                     <a:solidFill>
                       <a:srgbClr val="000000"/>
                     </a:solidFill>
@@ -9689,7 +9697,7 @@
               </a:ln>
               <a:extLst>
                 <a:ext uri="{91240B29-F687-4f45-9708-019B960494DF}">
-                  <a14:hiddenLine xmlns:a14="http://schemas.microsoft.com/office/drawing/2010/main" xmlns="" w="9525">
+                  <a14:hiddenLine xmlns="" xmlns:a14="http://schemas.microsoft.com/office/drawing/2010/main" w="9525">
                     <a:solidFill>
                       <a:srgbClr val="000000"/>
                     </a:solidFill>
@@ -9751,7 +9759,7 @@
               </a:ln>
               <a:extLst>
                 <a:ext uri="{91240B29-F687-4f45-9708-019B960494DF}">
-                  <a14:hiddenLine xmlns:a14="http://schemas.microsoft.com/office/drawing/2010/main" xmlns="" w="9525">
+                  <a14:hiddenLine xmlns="" xmlns:a14="http://schemas.microsoft.com/office/drawing/2010/main" w="9525">
                     <a:solidFill>
                       <a:srgbClr val="000000"/>
                     </a:solidFill>
@@ -9861,7 +9869,7 @@
               </a:ln>
               <a:extLst>
                 <a:ext uri="{91240B29-F687-4f45-9708-019B960494DF}">
-                  <a14:hiddenLine xmlns:a14="http://schemas.microsoft.com/office/drawing/2010/main" xmlns="" w="9525">
+                  <a14:hiddenLine xmlns="" xmlns:a14="http://schemas.microsoft.com/office/drawing/2010/main" w="9525">
                     <a:solidFill>
                       <a:srgbClr val="000000"/>
                     </a:solidFill>
@@ -9945,7 +9953,7 @@
               </a:ln>
               <a:extLst>
                 <a:ext uri="{91240B29-F687-4f45-9708-019B960494DF}">
-                  <a14:hiddenLine xmlns:a14="http://schemas.microsoft.com/office/drawing/2010/main" xmlns="" w="9525">
+                  <a14:hiddenLine xmlns="" xmlns:a14="http://schemas.microsoft.com/office/drawing/2010/main" w="9525">
                     <a:solidFill>
                       <a:srgbClr val="000000"/>
                     </a:solidFill>
@@ -10007,7 +10015,7 @@
               </a:ln>
               <a:extLst>
                 <a:ext uri="{91240B29-F687-4f45-9708-019B960494DF}">
-                  <a14:hiddenLine xmlns:a14="http://schemas.microsoft.com/office/drawing/2010/main" xmlns="" w="9525">
+                  <a14:hiddenLine xmlns="" xmlns:a14="http://schemas.microsoft.com/office/drawing/2010/main" w="9525">
                     <a:solidFill>
                       <a:srgbClr val="000000"/>
                     </a:solidFill>
@@ -10069,7 +10077,7 @@
               </a:ln>
               <a:extLst>
                 <a:ext uri="{91240B29-F687-4f45-9708-019B960494DF}">
-                  <a14:hiddenLine xmlns:a14="http://schemas.microsoft.com/office/drawing/2010/main" xmlns="" w="9525">
+                  <a14:hiddenLine xmlns="" xmlns:a14="http://schemas.microsoft.com/office/drawing/2010/main" w="9525">
                     <a:solidFill>
                       <a:srgbClr val="000000"/>
                     </a:solidFill>
@@ -10159,7 +10167,7 @@
               </a:ln>
               <a:extLst>
                 <a:ext uri="{91240B29-F687-4f45-9708-019B960494DF}">
-                  <a14:hiddenLine xmlns:a14="http://schemas.microsoft.com/office/drawing/2010/main" xmlns="" w="9525">
+                  <a14:hiddenLine xmlns="" xmlns:a14="http://schemas.microsoft.com/office/drawing/2010/main" w="9525">
                     <a:solidFill>
                       <a:srgbClr val="000000"/>
                     </a:solidFill>
@@ -10193,7 +10201,7 @@
               </a:ln>
               <a:extLst>
                 <a:ext uri="{91240B29-F687-4f45-9708-019B960494DF}">
-                  <a14:hiddenLine xmlns:a14="http://schemas.microsoft.com/office/drawing/2010/main" xmlns="" w="9525">
+                  <a14:hiddenLine xmlns="" xmlns:a14="http://schemas.microsoft.com/office/drawing/2010/main" w="9525">
                     <a:solidFill>
                       <a:srgbClr val="000000"/>
                     </a:solidFill>
@@ -10258,7 +10266,7 @@
               </a:ln>
               <a:extLst>
                 <a:ext uri="{91240B29-F687-4f45-9708-019B960494DF}">
-                  <a14:hiddenLine xmlns:a14="http://schemas.microsoft.com/office/drawing/2010/main" xmlns="" w="9525">
+                  <a14:hiddenLine xmlns="" xmlns:a14="http://schemas.microsoft.com/office/drawing/2010/main" w="9525">
                     <a:solidFill>
                       <a:srgbClr val="000000"/>
                     </a:solidFill>
@@ -10348,7 +10356,7 @@
               </a:ln>
               <a:extLst>
                 <a:ext uri="{91240B29-F687-4f45-9708-019B960494DF}">
-                  <a14:hiddenLine xmlns:a14="http://schemas.microsoft.com/office/drawing/2010/main" xmlns="" w="9525">
+                  <a14:hiddenLine xmlns="" xmlns:a14="http://schemas.microsoft.com/office/drawing/2010/main" w="9525">
                     <a:solidFill>
                       <a:srgbClr val="000000"/>
                     </a:solidFill>
@@ -10410,7 +10418,7 @@
               </a:ln>
               <a:extLst>
                 <a:ext uri="{91240B29-F687-4f45-9708-019B960494DF}">
-                  <a14:hiddenLine xmlns:a14="http://schemas.microsoft.com/office/drawing/2010/main" xmlns="" w="9525">
+                  <a14:hiddenLine xmlns="" xmlns:a14="http://schemas.microsoft.com/office/drawing/2010/main" w="9525">
                     <a:solidFill>
                       <a:srgbClr val="000000"/>
                     </a:solidFill>
@@ -10500,7 +10508,7 @@
               </a:ln>
               <a:extLst>
                 <a:ext uri="{91240B29-F687-4f45-9708-019B960494DF}">
-                  <a14:hiddenLine xmlns:a14="http://schemas.microsoft.com/office/drawing/2010/main" xmlns="" w="9525">
+                  <a14:hiddenLine xmlns="" xmlns:a14="http://schemas.microsoft.com/office/drawing/2010/main" w="9525">
                     <a:solidFill>
                       <a:srgbClr val="000000"/>
                     </a:solidFill>
@@ -10565,7 +10573,7 @@
               </a:ln>
               <a:extLst>
                 <a:ext uri="{91240B29-F687-4f45-9708-019B960494DF}">
-                  <a14:hiddenLine xmlns:a14="http://schemas.microsoft.com/office/drawing/2010/main" xmlns="" w="9525">
+                  <a14:hiddenLine xmlns="" xmlns:a14="http://schemas.microsoft.com/office/drawing/2010/main" w="9525">
                     <a:solidFill>
                       <a:srgbClr val="000000"/>
                     </a:solidFill>
@@ -10627,7 +10635,7 @@
               </a:ln>
               <a:extLst>
                 <a:ext uri="{91240B29-F687-4f45-9708-019B960494DF}">
-                  <a14:hiddenLine xmlns:a14="http://schemas.microsoft.com/office/drawing/2010/main" xmlns="" w="9525">
+                  <a14:hiddenLine xmlns="" xmlns:a14="http://schemas.microsoft.com/office/drawing/2010/main" w="9525">
                     <a:solidFill>
                       <a:srgbClr val="000000"/>
                     </a:solidFill>
@@ -10717,7 +10725,7 @@
               </a:ln>
               <a:extLst>
                 <a:ext uri="{91240B29-F687-4f45-9708-019B960494DF}">
-                  <a14:hiddenLine xmlns:a14="http://schemas.microsoft.com/office/drawing/2010/main" xmlns="" w="9525">
+                  <a14:hiddenLine xmlns="" xmlns:a14="http://schemas.microsoft.com/office/drawing/2010/main" w="9525">
                     <a:solidFill>
                       <a:srgbClr val="000000"/>
                     </a:solidFill>
@@ -10807,7 +10815,7 @@
               </a:ln>
               <a:extLst>
                 <a:ext uri="{91240B29-F687-4f45-9708-019B960494DF}">
-                  <a14:hiddenLine xmlns:a14="http://schemas.microsoft.com/office/drawing/2010/main" xmlns="" w="9525">
+                  <a14:hiddenLine xmlns="" xmlns:a14="http://schemas.microsoft.com/office/drawing/2010/main" w="9525">
                     <a:solidFill>
                       <a:srgbClr val="000000"/>
                     </a:solidFill>
@@ -10872,7 +10880,7 @@
               </a:ln>
               <a:extLst>
                 <a:ext uri="{91240B29-F687-4f45-9708-019B960494DF}">
-                  <a14:hiddenLine xmlns:a14="http://schemas.microsoft.com/office/drawing/2010/main" xmlns="" w="9525">
+                  <a14:hiddenLine xmlns="" xmlns:a14="http://schemas.microsoft.com/office/drawing/2010/main" w="9525">
                     <a:solidFill>
                       <a:srgbClr val="000000"/>
                     </a:solidFill>
@@ -10992,7 +11000,7 @@
               </a:ln>
               <a:extLst>
                 <a:ext uri="{91240B29-F687-4f45-9708-019B960494DF}">
-                  <a14:hiddenLine xmlns:a14="http://schemas.microsoft.com/office/drawing/2010/main" xmlns="" w="9525">
+                  <a14:hiddenLine xmlns="" xmlns:a14="http://schemas.microsoft.com/office/drawing/2010/main" w="9525">
                     <a:solidFill>
                       <a:srgbClr val="000000"/>
                     </a:solidFill>
@@ -11073,7 +11081,7 @@
               </a:ln>
               <a:extLst>
                 <a:ext uri="{91240B29-F687-4f45-9708-019B960494DF}">
-                  <a14:hiddenLine xmlns:a14="http://schemas.microsoft.com/office/drawing/2010/main" xmlns="" w="9525">
+                  <a14:hiddenLine xmlns="" xmlns:a14="http://schemas.microsoft.com/office/drawing/2010/main" w="9525">
                     <a:solidFill>
                       <a:srgbClr val="000000"/>
                     </a:solidFill>
@@ -11188,7 +11196,7 @@
               </a:ln>
               <a:extLst>
                 <a:ext uri="{91240B29-F687-4f45-9708-019B960494DF}">
-                  <a14:hiddenLine xmlns:a14="http://schemas.microsoft.com/office/drawing/2010/main" xmlns="" w="9525">
+                  <a14:hiddenLine xmlns="" xmlns:a14="http://schemas.microsoft.com/office/drawing/2010/main" w="9525">
                     <a:solidFill>
                       <a:srgbClr val="000000"/>
                     </a:solidFill>
@@ -11278,7 +11286,7 @@
               </a:ln>
               <a:extLst>
                 <a:ext uri="{91240B29-F687-4f45-9708-019B960494DF}">
-                  <a14:hiddenLine xmlns:a14="http://schemas.microsoft.com/office/drawing/2010/main" xmlns="" w="9525">
+                  <a14:hiddenLine xmlns="" xmlns:a14="http://schemas.microsoft.com/office/drawing/2010/main" w="9525">
                     <a:solidFill>
                       <a:srgbClr val="000000"/>
                     </a:solidFill>
@@ -11343,7 +11351,7 @@
               </a:ln>
               <a:extLst>
                 <a:ext uri="{91240B29-F687-4f45-9708-019B960494DF}">
-                  <a14:hiddenLine xmlns:a14="http://schemas.microsoft.com/office/drawing/2010/main" xmlns="" w="9525">
+                  <a14:hiddenLine xmlns="" xmlns:a14="http://schemas.microsoft.com/office/drawing/2010/main" w="9525">
                     <a:solidFill>
                       <a:srgbClr val="000000"/>
                     </a:solidFill>
@@ -11433,7 +11441,7 @@
               </a:ln>
               <a:extLst>
                 <a:ext uri="{91240B29-F687-4f45-9708-019B960494DF}">
-                  <a14:hiddenLine xmlns:a14="http://schemas.microsoft.com/office/drawing/2010/main" xmlns="" w="9525">
+                  <a14:hiddenLine xmlns="" xmlns:a14="http://schemas.microsoft.com/office/drawing/2010/main" w="9525">
                     <a:solidFill>
                       <a:srgbClr val="000000"/>
                     </a:solidFill>
@@ -11501,7 +11509,7 @@
               </a:ln>
               <a:extLst>
                 <a:ext uri="{91240B29-F687-4f45-9708-019B960494DF}">
-                  <a14:hiddenLine xmlns:a14="http://schemas.microsoft.com/office/drawing/2010/main" xmlns="" w="9525">
+                  <a14:hiddenLine xmlns="" xmlns:a14="http://schemas.microsoft.com/office/drawing/2010/main" w="9525">
                     <a:solidFill>
                       <a:srgbClr val="000000"/>
                     </a:solidFill>
@@ -11591,7 +11599,7 @@
               </a:ln>
               <a:extLst>
                 <a:ext uri="{91240B29-F687-4f45-9708-019B960494DF}">
-                  <a14:hiddenLine xmlns:a14="http://schemas.microsoft.com/office/drawing/2010/main" xmlns="" w="9525">
+                  <a14:hiddenLine xmlns="" xmlns:a14="http://schemas.microsoft.com/office/drawing/2010/main" w="9525">
                     <a:solidFill>
                       <a:srgbClr val="000000"/>
                     </a:solidFill>
@@ -11659,7 +11667,7 @@
               </a:ln>
               <a:extLst>
                 <a:ext uri="{91240B29-F687-4f45-9708-019B960494DF}">
-                  <a14:hiddenLine xmlns:a14="http://schemas.microsoft.com/office/drawing/2010/main" xmlns="" w="9525">
+                  <a14:hiddenLine xmlns="" xmlns:a14="http://schemas.microsoft.com/office/drawing/2010/main" w="9525">
                     <a:solidFill>
                       <a:srgbClr val="000000"/>
                     </a:solidFill>
@@ -11749,7 +11757,7 @@
               </a:ln>
               <a:extLst>
                 <a:ext uri="{91240B29-F687-4f45-9708-019B960494DF}">
-                  <a14:hiddenLine xmlns:a14="http://schemas.microsoft.com/office/drawing/2010/main" xmlns="" w="9525">
+                  <a14:hiddenLine xmlns="" xmlns:a14="http://schemas.microsoft.com/office/drawing/2010/main" w="9525">
                     <a:solidFill>
                       <a:srgbClr val="000000"/>
                     </a:solidFill>
@@ -11783,7 +11791,7 @@
               </a:ln>
               <a:extLst>
                 <a:ext uri="{91240B29-F687-4f45-9708-019B960494DF}">
-                  <a14:hiddenLine xmlns:a14="http://schemas.microsoft.com/office/drawing/2010/main" xmlns="" w="9525">
+                  <a14:hiddenLine xmlns="" xmlns:a14="http://schemas.microsoft.com/office/drawing/2010/main" w="9525">
                     <a:solidFill>
                       <a:srgbClr val="000000"/>
                     </a:solidFill>
@@ -12549,14 +12557,7 @@
             <a:pPr lvl="1"/>
             <a:r>
               <a:rPr lang="en-US" dirty="0"/>
-              <a:t>You have a git client installed</a:t>
-            </a:r>
-          </a:p>
-          <a:p>
-            <a:pPr lvl="1"/>
-            <a:r>
-              <a:rPr lang="en-US" dirty="0"/>
-              <a:t>You have a login to a git repository</a:t>
+              <a:t>You have git/git client installed</a:t>
             </a:r>
           </a:p>
         </p:txBody>
@@ -12571,18 +12572,341 @@
   <p:clrMapOvr>
     <a:masterClrMapping/>
   </p:clrMapOvr>
-  <mc:AlternateContent xmlns:mc="http://schemas.openxmlformats.org/markup-compatibility/2006">
-    <mc:Choice xmlns:p159="http://schemas.microsoft.com/office/powerpoint/2015/09/main" Requires="p159">
+  <mc:AlternateContent xmlns:mc="http://schemas.openxmlformats.org/markup-compatibility/2006" xmlns:p159="http://schemas.microsoft.com/office/powerpoint/2015/09/main">
+    <mc:Choice Requires="p159">
       <p:transition xmlns:p14="http://schemas.microsoft.com/office/powerpoint/2010/main" spd="slow" p14:dur="2000">
         <p159:morph option="byObject"/>
       </p:transition>
     </mc:Choice>
-    <mc:Fallback>
+    <mc:Fallback xmlns="">
       <p:transition spd="slow">
         <p:fade/>
       </p:transition>
     </mc:Fallback>
   </mc:AlternateContent>
+</p:sld>
+</file>
+
+<file path=ppt/slides/slide3.xml><?xml version="1.0" encoding="utf-8"?>
+<p:sld xmlns:a="http://schemas.openxmlformats.org/drawingml/2006/main" xmlns:r="http://schemas.openxmlformats.org/officeDocument/2006/relationships" xmlns:p="http://schemas.openxmlformats.org/presentationml/2006/main">
+  <p:cSld>
+    <p:spTree>
+      <p:nvGrpSpPr>
+        <p:cNvPr id="1" name=""/>
+        <p:cNvGrpSpPr/>
+        <p:nvPr/>
+      </p:nvGrpSpPr>
+      <p:grpSpPr>
+        <a:xfrm>
+          <a:off x="0" y="0"/>
+          <a:ext cx="0" cy="0"/>
+          <a:chOff x="0" y="0"/>
+          <a:chExt cx="0" cy="0"/>
+        </a:xfrm>
+      </p:grpSpPr>
+      <p:sp>
+        <p:nvSpPr>
+          <p:cNvPr id="2" name="Title 1">
+            <a:extLst>
+              <a:ext uri="{FF2B5EF4-FFF2-40B4-BE49-F238E27FC236}">
+                <a16:creationId xmlns:a16="http://schemas.microsoft.com/office/drawing/2014/main" id="{B3931343-6558-421A-B9D0-28A7F06646FE}"/>
+              </a:ext>
+            </a:extLst>
+          </p:cNvPr>
+          <p:cNvSpPr>
+            <a:spLocks noGrp="1"/>
+          </p:cNvSpPr>
+          <p:nvPr>
+            <p:ph type="title"/>
+          </p:nvPr>
+        </p:nvSpPr>
+        <p:spPr/>
+        <p:txBody>
+          <a:bodyPr/>
+          <a:lstStyle/>
+          <a:p>
+            <a:r>
+              <a:rPr lang="en-US" dirty="0"/>
+              <a:t>Basic commands</a:t>
+            </a:r>
+          </a:p>
+        </p:txBody>
+      </p:sp>
+      <p:sp>
+        <p:nvSpPr>
+          <p:cNvPr id="3" name="Content Placeholder 2">
+            <a:extLst>
+              <a:ext uri="{FF2B5EF4-FFF2-40B4-BE49-F238E27FC236}">
+                <a16:creationId xmlns:a16="http://schemas.microsoft.com/office/drawing/2014/main" id="{6879E4C0-EF21-4E5B-B033-265411077166}"/>
+              </a:ext>
+            </a:extLst>
+          </p:cNvPr>
+          <p:cNvSpPr>
+            <a:spLocks noGrp="1"/>
+          </p:cNvSpPr>
+          <p:nvPr>
+            <p:ph idx="1"/>
+          </p:nvPr>
+        </p:nvSpPr>
+        <p:spPr/>
+        <p:txBody>
+          <a:bodyPr/>
+          <a:lstStyle/>
+          <a:p>
+            <a:r>
+              <a:rPr lang="en-US" dirty="0"/>
+              <a:t>Clone</a:t>
+            </a:r>
+          </a:p>
+          <a:p>
+            <a:r>
+              <a:rPr lang="en-US" dirty="0"/>
+              <a:t>Pull</a:t>
+            </a:r>
+          </a:p>
+          <a:p>
+            <a:r>
+              <a:rPr lang="en-US" dirty="0"/>
+              <a:t>Push</a:t>
+            </a:r>
+          </a:p>
+          <a:p>
+            <a:r>
+              <a:rPr lang="en-US" dirty="0"/>
+              <a:t>Branch</a:t>
+            </a:r>
+          </a:p>
+          <a:p>
+            <a:r>
+              <a:rPr lang="en-US" dirty="0"/>
+              <a:t>Merge</a:t>
+            </a:r>
+          </a:p>
+          <a:p>
+            <a:r>
+              <a:rPr lang="en-US" dirty="0"/>
+              <a:t>Changing Branches</a:t>
+            </a:r>
+          </a:p>
+        </p:txBody>
+      </p:sp>
+    </p:spTree>
+    <p:extLst>
+      <p:ext uri="{BB962C8B-B14F-4D97-AF65-F5344CB8AC3E}">
+        <p14:creationId xmlns:p14="http://schemas.microsoft.com/office/powerpoint/2010/main" val="3150320838"/>
+      </p:ext>
+    </p:extLst>
+  </p:cSld>
+  <p:clrMapOvr>
+    <a:masterClrMapping/>
+  </p:clrMapOvr>
+</p:sld>
+</file>
+
+<file path=ppt/slides/slide4.xml><?xml version="1.0" encoding="utf-8"?>
+<p:sld xmlns:a="http://schemas.openxmlformats.org/drawingml/2006/main" xmlns:r="http://schemas.openxmlformats.org/officeDocument/2006/relationships" xmlns:p="http://schemas.openxmlformats.org/presentationml/2006/main">
+  <p:cSld>
+    <p:spTree>
+      <p:nvGrpSpPr>
+        <p:cNvPr id="1" name=""/>
+        <p:cNvGrpSpPr/>
+        <p:nvPr/>
+      </p:nvGrpSpPr>
+      <p:grpSpPr>
+        <a:xfrm>
+          <a:off x="0" y="0"/>
+          <a:ext cx="0" cy="0"/>
+          <a:chOff x="0" y="0"/>
+          <a:chExt cx="0" cy="0"/>
+        </a:xfrm>
+      </p:grpSpPr>
+      <p:sp>
+        <p:nvSpPr>
+          <p:cNvPr id="2" name="Title 1">
+            <a:extLst>
+              <a:ext uri="{FF2B5EF4-FFF2-40B4-BE49-F238E27FC236}">
+                <a16:creationId xmlns:a16="http://schemas.microsoft.com/office/drawing/2014/main" id="{BABF9970-ABFE-4D34-842C-5356FFF4A2D9}"/>
+              </a:ext>
+            </a:extLst>
+          </p:cNvPr>
+          <p:cNvSpPr>
+            <a:spLocks noGrp="1"/>
+          </p:cNvSpPr>
+          <p:nvPr>
+            <p:ph type="title"/>
+          </p:nvPr>
+        </p:nvSpPr>
+        <p:spPr/>
+        <p:txBody>
+          <a:bodyPr/>
+          <a:lstStyle/>
+          <a:p>
+            <a:r>
+              <a:rPr lang="en-US" dirty="0"/>
+              <a:t>Demo Time</a:t>
+            </a:r>
+          </a:p>
+        </p:txBody>
+      </p:sp>
+      <p:sp>
+        <p:nvSpPr>
+          <p:cNvPr id="3" name="Content Placeholder 2">
+            <a:extLst>
+              <a:ext uri="{FF2B5EF4-FFF2-40B4-BE49-F238E27FC236}">
+                <a16:creationId xmlns:a16="http://schemas.microsoft.com/office/drawing/2014/main" id="{60275719-0D71-4E15-9DA5-BF0B352466AD}"/>
+              </a:ext>
+            </a:extLst>
+          </p:cNvPr>
+          <p:cNvSpPr>
+            <a:spLocks noGrp="1"/>
+          </p:cNvSpPr>
+          <p:nvPr>
+            <p:ph idx="1"/>
+          </p:nvPr>
+        </p:nvSpPr>
+        <p:spPr/>
+        <p:txBody>
+          <a:bodyPr/>
+          <a:lstStyle/>
+          <a:p>
+            <a:endParaRPr lang="en-US"/>
+          </a:p>
+        </p:txBody>
+      </p:sp>
+    </p:spTree>
+    <p:extLst>
+      <p:ext uri="{BB962C8B-B14F-4D97-AF65-F5344CB8AC3E}">
+        <p14:creationId xmlns:p14="http://schemas.microsoft.com/office/powerpoint/2010/main" val="3574669288"/>
+      </p:ext>
+    </p:extLst>
+  </p:cSld>
+  <p:clrMapOvr>
+    <a:masterClrMapping/>
+  </p:clrMapOvr>
+</p:sld>
+</file>
+
+<file path=ppt/slides/slide5.xml><?xml version="1.0" encoding="utf-8"?>
+<p:sld xmlns:a="http://schemas.openxmlformats.org/drawingml/2006/main" xmlns:r="http://schemas.openxmlformats.org/officeDocument/2006/relationships" xmlns:p="http://schemas.openxmlformats.org/presentationml/2006/main">
+  <p:cSld>
+    <p:spTree>
+      <p:nvGrpSpPr>
+        <p:cNvPr id="1" name=""/>
+        <p:cNvGrpSpPr/>
+        <p:nvPr/>
+      </p:nvGrpSpPr>
+      <p:grpSpPr>
+        <a:xfrm>
+          <a:off x="0" y="0"/>
+          <a:ext cx="0" cy="0"/>
+          <a:chOff x="0" y="0"/>
+          <a:chExt cx="0" cy="0"/>
+        </a:xfrm>
+      </p:grpSpPr>
+      <p:sp>
+        <p:nvSpPr>
+          <p:cNvPr id="2" name="Title 1">
+            <a:extLst>
+              <a:ext uri="{FF2B5EF4-FFF2-40B4-BE49-F238E27FC236}">
+                <a16:creationId xmlns:a16="http://schemas.microsoft.com/office/drawing/2014/main" id="{146607C7-8DE5-4386-9CBB-BD4CB719FD58}"/>
+              </a:ext>
+            </a:extLst>
+          </p:cNvPr>
+          <p:cNvSpPr>
+            <a:spLocks noGrp="1"/>
+          </p:cNvSpPr>
+          <p:nvPr>
+            <p:ph type="title"/>
+          </p:nvPr>
+        </p:nvSpPr>
+        <p:spPr/>
+        <p:txBody>
+          <a:bodyPr/>
+          <a:lstStyle/>
+          <a:p>
+            <a:r>
+              <a:rPr lang="en-US" dirty="0"/>
+              <a:t>Additional Resources</a:t>
+            </a:r>
+          </a:p>
+        </p:txBody>
+      </p:sp>
+      <p:sp>
+        <p:nvSpPr>
+          <p:cNvPr id="3" name="Content Placeholder 2">
+            <a:extLst>
+              <a:ext uri="{FF2B5EF4-FFF2-40B4-BE49-F238E27FC236}">
+                <a16:creationId xmlns:a16="http://schemas.microsoft.com/office/drawing/2014/main" id="{BDE93C19-DBC7-41ED-835F-76B07D17CB56}"/>
+              </a:ext>
+            </a:extLst>
+          </p:cNvPr>
+          <p:cNvSpPr>
+            <a:spLocks noGrp="1"/>
+          </p:cNvSpPr>
+          <p:nvPr>
+            <p:ph idx="1"/>
+          </p:nvPr>
+        </p:nvSpPr>
+        <p:spPr/>
+        <p:txBody>
+          <a:bodyPr/>
+          <a:lstStyle/>
+          <a:p>
+            <a:r>
+              <a:rPr lang="en-US" dirty="0"/>
+              <a:t>Git Essentials </a:t>
+            </a:r>
+            <a:r>
+              <a:rPr lang="en-US" dirty="0" err="1"/>
+              <a:t>Ebook</a:t>
+            </a:r>
+            <a:r>
+              <a:rPr lang="en-US" dirty="0"/>
+              <a:t> </a:t>
+            </a:r>
+          </a:p>
+          <a:p>
+            <a:pPr lvl="1"/>
+            <a:r>
+              <a:rPr lang="en-US" dirty="0">
+                <a:hlinkClick r:id="rId2"/>
+              </a:rPr>
+              <a:t>https://git-scm.com/book/en/v2</a:t>
+            </a:r>
+            <a:endParaRPr lang="en-US" dirty="0"/>
+          </a:p>
+          <a:p>
+            <a:r>
+              <a:rPr lang="en-US" dirty="0" err="1"/>
+              <a:t>Github</a:t>
+            </a:r>
+            <a:r>
+              <a:rPr lang="en-US" dirty="0"/>
+              <a:t> Training</a:t>
+            </a:r>
+          </a:p>
+          <a:p>
+            <a:pPr lvl="1"/>
+            <a:r>
+              <a:rPr lang="en-US" dirty="0">
+                <a:hlinkClick r:id="rId3"/>
+              </a:rPr>
+              <a:t>https://training.github.com</a:t>
+            </a:r>
+            <a:endParaRPr lang="en-US" dirty="0"/>
+          </a:p>
+        </p:txBody>
+      </p:sp>
+    </p:spTree>
+    <p:extLst>
+      <p:ext uri="{BB962C8B-B14F-4D97-AF65-F5344CB8AC3E}">
+        <p14:creationId xmlns:p14="http://schemas.microsoft.com/office/powerpoint/2010/main" val="1757514018"/>
+      </p:ext>
+    </p:extLst>
+  </p:cSld>
+  <p:clrMapOvr>
+    <a:masterClrMapping/>
+  </p:clrMapOvr>
 </p:sld>
 </file>
 

</xml_diff>